<commit_message>
Fixes in the cover
</commit_message>
<xml_diff>
--- a/cover/CSharp-Principles-Cover-3D.pptx
+++ b/cover/CSharp-Principles-Cover-3D.pptx
@@ -104,6 +104,11 @@
       </a:defRPr>
     </a:lvl9pPr>
   </p:defaultTextStyle>
+  <p:extLst>
+    <p:ext uri="{EFAFB233-063F-42B5-8137-9DF3F51BA10A}">
+      <p15:sldGuideLst xmlns:p15="http://schemas.microsoft.com/office/powerpoint/2012/main"/>
+    </p:ext>
+  </p:extLst>
 </p:presentation>
 </file>
 
@@ -3386,14 +3391,21 @@
         </p:blipFill>
         <p:spPr>
           <a:xfrm>
-            <a:off x="4122419" y="739141"/>
-            <a:ext cx="4637706" cy="5490000"/>
+            <a:off x="4122418" y="745491"/>
+            <a:ext cx="4628583" cy="5479200"/>
           </a:xfrm>
-          <a:prstGeom prst="rect">
-            <a:avLst/>
+          <a:prstGeom prst="roundRect">
+            <a:avLst>
+              <a:gd name="adj" fmla="val 204"/>
+            </a:avLst>
           </a:prstGeom>
           <a:ln>
-            <a:noFill/>
+            <a:solidFill>
+              <a:schemeClr val="tx1">
+                <a:lumMod val="65000"/>
+                <a:lumOff val="35000"/>
+              </a:schemeClr>
+            </a:solidFill>
           </a:ln>
           <a:effectLst/>
           <a:scene3d>
@@ -3426,17 +3438,19 @@
         </p:blipFill>
         <p:spPr>
           <a:xfrm>
-            <a:off x="4297681" y="421526"/>
+            <a:off x="4296538" y="419733"/>
             <a:ext cx="568318" cy="6066000"/>
           </a:xfrm>
-          <a:prstGeom prst="rect">
-            <a:avLst/>
+          <a:prstGeom prst="roundRect">
+            <a:avLst>
+              <a:gd name="adj" fmla="val 577"/>
+            </a:avLst>
           </a:prstGeom>
           <a:ln>
             <a:solidFill>
               <a:schemeClr val="tx1">
-                <a:lumMod val="50000"/>
-                <a:lumOff val="50000"/>
+                <a:lumMod val="65000"/>
+                <a:lumOff val="35000"/>
               </a:schemeClr>
             </a:solidFill>
           </a:ln>

</xml_diff>